<commit_message>
New changes version 2.0
</commit_message>
<xml_diff>
--- a/Lending club case study.pptx
+++ b/Lending club case study.pptx
@@ -813,7 +813,7 @@
   <p:cSld>
     <p:spTree>
       <p:nvGrpSpPr>
-        <p:cNvPr id="339" name="Shape 339"/>
+        <p:cNvPr id="340" name="Shape 340"/>
         <p:cNvGrpSpPr/>
         <p:nvPr/>
       </p:nvGrpSpPr>
@@ -827,7 +827,7 @@
       </p:grpSpPr>
       <p:sp>
         <p:nvSpPr>
-          <p:cNvPr id="340" name="Google Shape;340;g1b3384e86ff_0_343:notes"/>
+          <p:cNvPr id="341" name="Google Shape;341;g1b3384e86ff_0_343:notes"/>
           <p:cNvSpPr/>
           <p:nvPr>
             <p:ph idx="2" type="sldImg"/>
@@ -862,7 +862,7 @@
       </p:sp>
       <p:sp>
         <p:nvSpPr>
-          <p:cNvPr id="341" name="Google Shape;341;g1b3384e86ff_0_343:notes"/>
+          <p:cNvPr id="342" name="Google Shape;342;g1b3384e86ff_0_343:notes"/>
           <p:cNvSpPr txBox="1"/>
           <p:nvPr>
             <p:ph idx="1" type="body"/>
@@ -1322,7 +1322,7 @@
       </p:grpSpPr>
       <p:sp>
         <p:nvSpPr>
-          <p:cNvPr id="306" name="Google Shape;306;g1b3384e86ff_0_300:notes"/>
+          <p:cNvPr id="306" name="Google Shape;306;g1b10aaff553_0_31:notes"/>
           <p:cNvSpPr/>
           <p:nvPr>
             <p:ph idx="2" type="sldImg"/>
@@ -1357,7 +1357,7 @@
       </p:sp>
       <p:sp>
         <p:nvSpPr>
-          <p:cNvPr id="307" name="Google Shape;307;g1b3384e86ff_0_300:notes"/>
+          <p:cNvPr id="307" name="Google Shape;307;g1b10aaff553_0_31:notes"/>
           <p:cNvSpPr txBox="1"/>
           <p:nvPr>
             <p:ph idx="1" type="body"/>
@@ -1407,7 +1407,7 @@
   <p:cSld>
     <p:spTree>
       <p:nvGrpSpPr>
-        <p:cNvPr id="312" name="Shape 312"/>
+        <p:cNvPr id="314" name="Shape 314"/>
         <p:cNvGrpSpPr/>
         <p:nvPr/>
       </p:nvGrpSpPr>
@@ -1421,7 +1421,7 @@
       </p:grpSpPr>
       <p:sp>
         <p:nvSpPr>
-          <p:cNvPr id="313" name="Google Shape;313;g1b3384e86ff_0_306:notes"/>
+          <p:cNvPr id="315" name="Google Shape;315;g1b10aaff553_0_40:notes"/>
           <p:cNvSpPr/>
           <p:nvPr>
             <p:ph idx="2" type="sldImg"/>
@@ -1456,7 +1456,7 @@
       </p:sp>
       <p:sp>
         <p:nvSpPr>
-          <p:cNvPr id="314" name="Google Shape;314;g1b3384e86ff_0_306:notes"/>
+          <p:cNvPr id="316" name="Google Shape;316;g1b10aaff553_0_40:notes"/>
           <p:cNvSpPr txBox="1"/>
           <p:nvPr>
             <p:ph idx="1" type="body"/>
@@ -1506,7 +1506,7 @@
   <p:cSld>
     <p:spTree>
       <p:nvGrpSpPr>
-        <p:cNvPr id="321" name="Shape 321"/>
+        <p:cNvPr id="323" name="Shape 323"/>
         <p:cNvGrpSpPr/>
         <p:nvPr/>
       </p:nvGrpSpPr>
@@ -1520,7 +1520,7 @@
       </p:grpSpPr>
       <p:sp>
         <p:nvSpPr>
-          <p:cNvPr id="322" name="Google Shape;322;g1b3384e86ff_0_312:notes"/>
+          <p:cNvPr id="324" name="Google Shape;324;g1b10aaff553_0_55:notes"/>
           <p:cNvSpPr/>
           <p:nvPr>
             <p:ph idx="2" type="sldImg"/>
@@ -1555,7 +1555,7 @@
       </p:sp>
       <p:sp>
         <p:nvSpPr>
-          <p:cNvPr id="323" name="Google Shape;323;g1b3384e86ff_0_312:notes"/>
+          <p:cNvPr id="325" name="Google Shape;325;g1b10aaff553_0_55:notes"/>
           <p:cNvSpPr txBox="1"/>
           <p:nvPr>
             <p:ph idx="1" type="body"/>
@@ -1605,7 +1605,7 @@
   <p:cSld>
     <p:spTree>
       <p:nvGrpSpPr>
-        <p:cNvPr id="330" name="Shape 330"/>
+        <p:cNvPr id="332" name="Shape 332"/>
         <p:cNvGrpSpPr/>
         <p:nvPr/>
       </p:nvGrpSpPr>
@@ -1619,7 +1619,7 @@
       </p:grpSpPr>
       <p:sp>
         <p:nvSpPr>
-          <p:cNvPr id="331" name="Google Shape;331;g1b3384e86ff_0_318:notes"/>
+          <p:cNvPr id="333" name="Google Shape;333;g1b3384e86ff_0_318:notes"/>
           <p:cNvSpPr/>
           <p:nvPr>
             <p:ph idx="2" type="sldImg"/>
@@ -1654,7 +1654,7 @@
       </p:sp>
       <p:sp>
         <p:nvSpPr>
-          <p:cNvPr id="332" name="Google Shape;332;g1b3384e86ff_0_318:notes"/>
+          <p:cNvPr id="334" name="Google Shape;334;g1b3384e86ff_0_318:notes"/>
           <p:cNvSpPr txBox="1"/>
           <p:nvPr>
             <p:ph idx="1" type="body"/>
@@ -16079,7 +16079,7 @@
   <p:cSld>
     <p:spTree>
       <p:nvGrpSpPr>
-        <p:cNvPr id="342" name="Shape 342"/>
+        <p:cNvPr id="343" name="Shape 343"/>
         <p:cNvGrpSpPr/>
         <p:nvPr/>
       </p:nvGrpSpPr>
@@ -16093,7 +16093,7 @@
       </p:grpSpPr>
       <p:sp>
         <p:nvSpPr>
-          <p:cNvPr id="343" name="Google Shape;343;p22"/>
+          <p:cNvPr id="344" name="Google Shape;344;p22"/>
           <p:cNvSpPr txBox="1"/>
           <p:nvPr>
             <p:ph type="title"/>
@@ -16133,7 +16133,7 @@
       </p:sp>
       <p:sp>
         <p:nvSpPr>
-          <p:cNvPr id="344" name="Google Shape;344;p22"/>
+          <p:cNvPr id="345" name="Google Shape;345;p22"/>
           <p:cNvSpPr txBox="1"/>
           <p:nvPr>
             <p:ph idx="1" type="body"/>
@@ -16150,7 +16150,7 @@
         </p:spPr>
         <p:txBody>
           <a:bodyPr anchorCtr="0" anchor="t" bIns="91425" lIns="91425" spcFirstLastPara="1" rIns="91425" wrap="square" tIns="91425">
-            <a:normAutofit lnSpcReduction="10000"/>
+            <a:normAutofit/>
           </a:bodyPr>
           <a:lstStyle/>
           <a:p>
@@ -16166,7 +16166,15 @@
             </a:pPr>
             <a:r>
               <a:rPr lang="en"/>
-              <a:t>The dataset is either not equally distributed and is biased towards few values such as “debt consolidation, “10+ years experience” or most clients apply with the purpose of debt consolidation. </a:t>
+              <a:t>People borrowing money for small businesses have highest rate of default probably because of high risk of business not performing well along with factors like fall in the economy of the country etc. Hence Lenders should be </a:t>
+            </a:r>
+            <a:r>
+              <a:rPr lang="en"/>
+              <a:t>careful</a:t>
+            </a:r>
+            <a:r>
+              <a:rPr lang="en"/>
+              <a:t> before lending loans to them. </a:t>
             </a:r>
             <a:endParaRPr/>
           </a:p>
@@ -16183,7 +16191,7 @@
             </a:pPr>
             <a:r>
               <a:rPr lang="en"/>
-              <a:t>In that case, company should be careful to lending loans to these clients. One reason for defaulting may be higher interest rates on these personal loans. </a:t>
+              <a:t> Loans grades as E,F and G have highest default risk because interest rates going up to 20%. Maybe the company should reduce the interest on these loans to reduce the risk of defaulting.</a:t>
             </a:r>
             <a:endParaRPr/>
           </a:p>
@@ -16200,23 +16208,7 @@
             </a:pPr>
             <a:r>
               <a:rPr lang="en"/>
-              <a:t>There is a </a:t>
-            </a:r>
-            <a:r>
-              <a:rPr lang="en"/>
-              <a:t>probability</a:t>
-            </a:r>
-            <a:r>
-              <a:rPr lang="en"/>
-              <a:t> that loan granters are not grading the loans right as grade B loans have high chance of defaulting which </a:t>
-            </a:r>
-            <a:r>
-              <a:rPr lang="en"/>
-              <a:t>contradicts</a:t>
-            </a:r>
-            <a:r>
-              <a:rPr lang="en"/>
-              <a:t> the fact that grade B loans have lower risk of non-repayment.</a:t>
+              <a:t>Interest rate is quite high for every purpose value</a:t>
             </a:r>
             <a:endParaRPr/>
           </a:p>
@@ -16233,7 +16225,11 @@
             </a:pPr>
             <a:r>
               <a:rPr lang="en"/>
-              <a:t>From the perspective of loan borrower, one should apply in the months of lower interest rates and loans </a:t>
+              <a:t>Interest rate also increases with term on loan.</a:t>
+            </a:r>
+            <a:r>
+              <a:rPr lang="en"/>
+              <a:t> Loan with 36 months loan has higher interest rate than loan with 60 months. The company </a:t>
             </a:r>
             <a:r>
               <a:rPr lang="en"/>
@@ -16241,40 +16237,7 @@
             </a:r>
             <a:r>
               <a:rPr lang="en"/>
-              <a:t> be carefully lended in the months with high interest rates. </a:t>
-            </a:r>
-            <a:endParaRPr/>
-          </a:p>
-          <a:p>
-            <a:pPr indent="-311150" lvl="0" marL="457200" rtl="0" algn="l">
-              <a:spcBef>
-                <a:spcPts val="0"/>
-              </a:spcBef>
-              <a:spcAft>
-                <a:spcPts val="0"/>
-              </a:spcAft>
-              <a:buSzPts val="1300"/>
-              <a:buChar char="-"/>
-            </a:pPr>
-            <a:r>
-              <a:rPr lang="en"/>
-              <a:t>Verification status and home ownership don’t contribute much to defaulting but </a:t>
-            </a:r>
-            <a:r>
-              <a:rPr lang="en"/>
-              <a:t>company</a:t>
-            </a:r>
-            <a:r>
-              <a:rPr lang="en"/>
-              <a:t> should </a:t>
-            </a:r>
-            <a:r>
-              <a:rPr lang="en"/>
-              <a:t>verify</a:t>
-            </a:r>
-            <a:r>
-              <a:rPr lang="en"/>
-              <a:t> the income of the clients to be on the safer side. </a:t>
+              <a:t> reduce the interest rate on 60 months loans.</a:t>
             </a:r>
             <a:endParaRPr/>
           </a:p>
@@ -17302,7 +17265,7 @@
         </p:spPr>
         <p:txBody>
           <a:bodyPr anchorCtr="0" anchor="t" bIns="91425" lIns="91425" spcFirstLastPara="1" rIns="91425" wrap="square" tIns="91425">
-            <a:normAutofit/>
+            <a:normAutofit fontScale="90000"/>
           </a:bodyPr>
           <a:lstStyle/>
           <a:p>
@@ -17317,7 +17280,7 @@
             </a:pPr>
             <a:r>
               <a:rPr lang="en"/>
-              <a:t>Risk Probability of loans </a:t>
+              <a:t>Defaulters in different values of purpose</a:t>
             </a:r>
             <a:endParaRPr/>
           </a:p>
@@ -17333,8 +17296,8 @@
         </p:nvSpPr>
         <p:spPr>
           <a:xfrm>
-            <a:off x="1303800" y="1990050"/>
-            <a:ext cx="7030500" cy="2541600"/>
+            <a:off x="4498650" y="1597875"/>
+            <a:ext cx="3467100" cy="1080600"/>
           </a:xfrm>
           <a:prstGeom prst="rect">
             <a:avLst/>
@@ -17356,7 +17319,8 @@
               <a:buNone/>
             </a:pPr>
             <a:r>
-              <a:t/>
+              <a:rPr lang="en"/>
+              <a:t>People borrowing loan for small businesses have highest risk of not repaying their loan on time.</a:t>
             </a:r>
             <a:endParaRPr/>
           </a:p>
@@ -17378,8 +17342,8 @@
         </p:blipFill>
         <p:spPr>
           <a:xfrm>
-            <a:off x="1374263" y="1312488"/>
-            <a:ext cx="6395469" cy="3415675"/>
+            <a:off x="275100" y="1314550"/>
+            <a:ext cx="3657676" cy="2093974"/>
           </a:xfrm>
           <a:prstGeom prst="rect">
             <a:avLst/>
@@ -17390,6 +17354,74 @@
           </a:ln>
         </p:spPr>
       </p:pic>
+      <p:pic>
+        <p:nvPicPr>
+          <p:cNvPr id="312" name="Google Shape;312;p18"/>
+          <p:cNvPicPr preferRelativeResize="0"/>
+          <p:nvPr/>
+        </p:nvPicPr>
+        <p:blipFill>
+          <a:blip r:embed="rId4">
+            <a:alphaModFix/>
+          </a:blip>
+          <a:stretch>
+            <a:fillRect/>
+          </a:stretch>
+        </p:blipFill>
+        <p:spPr>
+          <a:xfrm>
+            <a:off x="5051375" y="2830325"/>
+            <a:ext cx="4092624" cy="2207626"/>
+          </a:xfrm>
+          <a:prstGeom prst="rect">
+            <a:avLst/>
+          </a:prstGeom>
+          <a:noFill/>
+          <a:ln>
+            <a:noFill/>
+          </a:ln>
+        </p:spPr>
+      </p:pic>
+      <p:sp>
+        <p:nvSpPr>
+          <p:cNvPr id="313" name="Google Shape;313;p18"/>
+          <p:cNvSpPr txBox="1"/>
+          <p:nvPr>
+            <p:ph idx="1" type="body"/>
+          </p:nvPr>
+        </p:nvSpPr>
+        <p:spPr>
+          <a:xfrm>
+            <a:off x="1031550" y="3715550"/>
+            <a:ext cx="3467100" cy="1080600"/>
+          </a:xfrm>
+          <a:prstGeom prst="rect">
+            <a:avLst/>
+          </a:prstGeom>
+        </p:spPr>
+        <p:txBody>
+          <a:bodyPr anchorCtr="0" anchor="t" bIns="91425" lIns="91425" spcFirstLastPara="1" rIns="91425" wrap="square" tIns="91425">
+            <a:normAutofit fontScale="85000" lnSpcReduction="10000"/>
+          </a:bodyPr>
+          <a:lstStyle/>
+          <a:p>
+            <a:pPr indent="0" lvl="0" marL="0" rtl="0" algn="l">
+              <a:spcBef>
+                <a:spcPts val="0"/>
+              </a:spcBef>
+              <a:spcAft>
+                <a:spcPts val="1200"/>
+              </a:spcAft>
+              <a:buNone/>
+            </a:pPr>
+            <a:r>
+              <a:rPr lang="en"/>
+              <a:t>From the above box plots we can observe that applicants of loan for "small businesses" with "charged off"loan status have highest interest rate on loans. Also there a pattern that can be observed that the rate of interest is higher for defaulters</a:t>
+            </a:r>
+            <a:endParaRPr/>
+          </a:p>
+        </p:txBody>
+      </p:sp>
     </p:spTree>
   </p:cSld>
   <p:clrMapOvr>
@@ -17403,7 +17435,7 @@
   <p:cSld>
     <p:spTree>
       <p:nvGrpSpPr>
-        <p:cNvPr id="315" name="Shape 315"/>
+        <p:cNvPr id="317" name="Shape 317"/>
         <p:cNvGrpSpPr/>
         <p:nvPr/>
       </p:nvGrpSpPr>
@@ -17417,7 +17449,7 @@
       </p:grpSpPr>
       <p:sp>
         <p:nvSpPr>
-          <p:cNvPr id="316" name="Google Shape;316;p19"/>
+          <p:cNvPr id="318" name="Google Shape;318;p19"/>
           <p:cNvSpPr txBox="1"/>
           <p:nvPr>
             <p:ph type="title"/>
@@ -17425,8 +17457,63 @@
         </p:nvSpPr>
         <p:spPr>
           <a:xfrm>
-            <a:off x="1303800" y="247050"/>
+            <a:off x="1303800" y="598575"/>
             <a:ext cx="7030500" cy="999300"/>
+          </a:xfrm>
+          <a:prstGeom prst="rect">
+            <a:avLst/>
+          </a:prstGeom>
+        </p:spPr>
+        <p:txBody>
+          <a:bodyPr anchorCtr="0" anchor="t" bIns="91425" lIns="91425" spcFirstLastPara="1" rIns="91425" wrap="square" tIns="91425">
+            <a:normAutofit fontScale="90000"/>
+          </a:bodyPr>
+          <a:lstStyle/>
+          <a:p>
+            <a:pPr indent="0" lvl="0" marL="0" rtl="0" algn="l">
+              <a:spcBef>
+                <a:spcPts val="0"/>
+              </a:spcBef>
+              <a:spcAft>
+                <a:spcPts val="0"/>
+              </a:spcAft>
+              <a:buNone/>
+            </a:pPr>
+            <a:r>
+              <a:rPr lang="en"/>
+              <a:t>Defaulters according to grades</a:t>
+            </a:r>
+            <a:endParaRPr/>
+          </a:p>
+          <a:p>
+            <a:pPr indent="0" lvl="0" marL="0" rtl="0" algn="l">
+              <a:spcBef>
+                <a:spcPts val="0"/>
+              </a:spcBef>
+              <a:spcAft>
+                <a:spcPts val="0"/>
+              </a:spcAft>
+              <a:buNone/>
+            </a:pPr>
+            <a:r>
+              <a:t/>
+            </a:r>
+            <a:endParaRPr/>
+          </a:p>
+        </p:txBody>
+      </p:sp>
+      <p:sp>
+        <p:nvSpPr>
+          <p:cNvPr id="319" name="Google Shape;319;p19"/>
+          <p:cNvSpPr txBox="1"/>
+          <p:nvPr>
+            <p:ph idx="1" type="body"/>
+          </p:nvPr>
+        </p:nvSpPr>
+        <p:spPr>
+          <a:xfrm>
+            <a:off x="4682875" y="1279650"/>
+            <a:ext cx="3943200" cy="1292100"/>
           </a:xfrm>
           <a:prstGeom prst="rect">
             <a:avLst/>
@@ -17443,54 +17530,13 @@
                 <a:spcPts val="0"/>
               </a:spcBef>
               <a:spcAft>
-                <a:spcPts val="0"/>
-              </a:spcAft>
-              <a:buSzPts val="990"/>
-              <a:buNone/>
-            </a:pPr>
-            <a:r>
-              <a:rPr lang="en" sz="2420"/>
-              <a:t>Who are the defaulters based on the reasons of application and why?</a:t>
-            </a:r>
-            <a:endParaRPr sz="2420"/>
-          </a:p>
-        </p:txBody>
-      </p:sp>
-      <p:sp>
-        <p:nvSpPr>
-          <p:cNvPr id="317" name="Google Shape;317;p19"/>
-          <p:cNvSpPr txBox="1"/>
-          <p:nvPr>
-            <p:ph idx="1" type="body"/>
-          </p:nvPr>
-        </p:nvSpPr>
-        <p:spPr>
-          <a:xfrm>
-            <a:off x="3961275" y="3201200"/>
-            <a:ext cx="5051400" cy="1850100"/>
-          </a:xfrm>
-          <a:prstGeom prst="rect">
-            <a:avLst/>
-          </a:prstGeom>
-        </p:spPr>
-        <p:txBody>
-          <a:bodyPr anchorCtr="0" anchor="t" bIns="91425" lIns="91425" spcFirstLastPara="1" rIns="91425" wrap="square" tIns="91425">
-            <a:normAutofit/>
-          </a:bodyPr>
-          <a:lstStyle/>
-          <a:p>
-            <a:pPr indent="0" lvl="0" marL="0" rtl="0" algn="l">
-              <a:spcBef>
-                <a:spcPts val="0"/>
-              </a:spcBef>
-              <a:spcAft>
                 <a:spcPts val="1200"/>
               </a:spcAft>
               <a:buNone/>
             </a:pPr>
             <a:r>
               <a:rPr lang="en"/>
-              <a:t>People borrowing loan for debt consolidation have highest risk of not repaying their loan on time. Lets a find a reason for this. From the above box plots we can observe that applicants of loan for "debt consolidation" have higher interest rate on loans than applicants that apply for other reasons which may be affecting their ability to repay their loans back on time.</a:t>
+              <a:t>From the above graph we can observe that rate of defaulting is increasing moving from A to B</a:t>
             </a:r>
             <a:endParaRPr/>
           </a:p>
@@ -17498,7 +17544,7 @@
       </p:sp>
       <p:pic>
         <p:nvPicPr>
-          <p:cNvPr id="318" name="Google Shape;318;p19"/>
+          <p:cNvPr id="320" name="Google Shape;320;p19"/>
           <p:cNvPicPr preferRelativeResize="0"/>
           <p:nvPr/>
         </p:nvPicPr>
@@ -17512,8 +17558,8 @@
         </p:blipFill>
         <p:spPr>
           <a:xfrm>
-            <a:off x="147175" y="1061325"/>
-            <a:ext cx="4179175" cy="2231999"/>
+            <a:off x="4514499" y="2778573"/>
+            <a:ext cx="3943200" cy="1982903"/>
           </a:xfrm>
           <a:prstGeom prst="rect">
             <a:avLst/>
@@ -17526,7 +17572,7 @@
       </p:pic>
       <p:pic>
         <p:nvPicPr>
-          <p:cNvPr id="319" name="Google Shape;319;p19"/>
+          <p:cNvPr id="321" name="Google Shape;321;p19"/>
           <p:cNvPicPr preferRelativeResize="0"/>
           <p:nvPr/>
         </p:nvPicPr>
@@ -17540,8 +17586,8 @@
         </p:blipFill>
         <p:spPr>
           <a:xfrm>
-            <a:off x="4939975" y="1061325"/>
-            <a:ext cx="3720060" cy="2231999"/>
+            <a:off x="276349" y="1153675"/>
+            <a:ext cx="3606475" cy="2085960"/>
           </a:xfrm>
           <a:prstGeom prst="rect">
             <a:avLst/>
@@ -17552,34 +17598,46 @@
           </a:ln>
         </p:spPr>
       </p:pic>
-      <p:pic>
-        <p:nvPicPr>
-          <p:cNvPr id="320" name="Google Shape;320;p19"/>
-          <p:cNvPicPr preferRelativeResize="0"/>
-          <p:nvPr/>
-        </p:nvPicPr>
-        <p:blipFill>
-          <a:blip r:embed="rId5">
-            <a:alphaModFix/>
-          </a:blip>
-          <a:stretch>
-            <a:fillRect/>
-          </a:stretch>
-        </p:blipFill>
+      <p:sp>
+        <p:nvSpPr>
+          <p:cNvPr id="322" name="Google Shape;322;p19"/>
+          <p:cNvSpPr txBox="1"/>
+          <p:nvPr>
+            <p:ph idx="1" type="body"/>
+          </p:nvPr>
+        </p:nvSpPr>
         <p:spPr>
           <a:xfrm>
-            <a:off x="411325" y="3404775"/>
-            <a:ext cx="3255576" cy="1738725"/>
+            <a:off x="415725" y="3501725"/>
+            <a:ext cx="3467100" cy="1080600"/>
           </a:xfrm>
           <a:prstGeom prst="rect">
             <a:avLst/>
           </a:prstGeom>
-          <a:noFill/>
-          <a:ln>
-            <a:noFill/>
-          </a:ln>
         </p:spPr>
-      </p:pic>
+        <p:txBody>
+          <a:bodyPr anchorCtr="0" anchor="t" bIns="91425" lIns="91425" spcFirstLastPara="1" rIns="91425" wrap="square" tIns="91425">
+            <a:normAutofit/>
+          </a:bodyPr>
+          <a:lstStyle/>
+          <a:p>
+            <a:pPr indent="0" lvl="0" marL="0" rtl="0" algn="l">
+              <a:spcBef>
+                <a:spcPts val="0"/>
+              </a:spcBef>
+              <a:spcAft>
+                <a:spcPts val="1200"/>
+              </a:spcAft>
+              <a:buNone/>
+            </a:pPr>
+            <a:r>
+              <a:rPr lang="en"/>
+              <a:t>Interest rate if very high for grades E F and G which may contribute to non-repayment of loan</a:t>
+            </a:r>
+            <a:endParaRPr/>
+          </a:p>
+        </p:txBody>
+      </p:sp>
     </p:spTree>
   </p:cSld>
   <p:clrMapOvr>
@@ -17593,7 +17651,7 @@
   <p:cSld>
     <p:spTree>
       <p:nvGrpSpPr>
-        <p:cNvPr id="324" name="Shape 324"/>
+        <p:cNvPr id="326" name="Shape 326"/>
         <p:cNvGrpSpPr/>
         <p:nvPr/>
       </p:nvGrpSpPr>
@@ -17607,7 +17665,7 @@
       </p:grpSpPr>
       <p:sp>
         <p:nvSpPr>
-          <p:cNvPr id="325" name="Google Shape;325;p20"/>
+          <p:cNvPr id="327" name="Google Shape;327;p20"/>
           <p:cNvSpPr txBox="1"/>
           <p:nvPr>
             <p:ph type="title"/>
@@ -17639,7 +17697,7 @@
             </a:pPr>
             <a:r>
               <a:rPr lang="en"/>
-              <a:t>Defaulters based on employee length</a:t>
+              <a:t>Term on the loan</a:t>
             </a:r>
             <a:endParaRPr/>
           </a:p>
@@ -17647,7 +17705,7 @@
       </p:sp>
       <p:sp>
         <p:nvSpPr>
-          <p:cNvPr id="326" name="Google Shape;326;p20"/>
+          <p:cNvPr id="328" name="Google Shape;328;p20"/>
           <p:cNvSpPr txBox="1"/>
           <p:nvPr>
             <p:ph idx="1" type="body"/>
@@ -17655,8 +17713,8 @@
         </p:nvSpPr>
         <p:spPr>
           <a:xfrm>
-            <a:off x="4572000" y="3108125"/>
-            <a:ext cx="4272000" cy="1849800"/>
+            <a:off x="4683963" y="1375900"/>
+            <a:ext cx="4204200" cy="999300"/>
           </a:xfrm>
           <a:prstGeom prst="rect">
             <a:avLst/>
@@ -17664,7 +17722,7 @@
         </p:spPr>
         <p:txBody>
           <a:bodyPr anchorCtr="0" anchor="t" bIns="91425" lIns="91425" spcFirstLastPara="1" rIns="91425" wrap="square" tIns="91425">
-            <a:normAutofit fontScale="92500" lnSpcReduction="20000"/>
+            <a:normAutofit/>
           </a:bodyPr>
           <a:lstStyle/>
           <a:p>
@@ -17679,7 +17737,7 @@
             </a:pPr>
             <a:r>
               <a:rPr lang="en"/>
-              <a:t>After applicants with 10+ years of professional experience, people with &lt;1 year experience have higher chance of defaulting.  From above boxplots we can observe that applicants with less than one year of employee length have loans with high interest rates than others which is probably because their purpose for loan would largely be education which has 14.6% as its interest rate and applicants with &lt;1 years employee length have 75% of interest rate around 15%</a:t>
+              <a:t>Most loans lended by the company have a term of 36 months or 3 years i.e the loan borrower has 3 years from the issue date to pay back to the company.</a:t>
             </a:r>
             <a:endParaRPr/>
           </a:p>
@@ -17687,7 +17745,7 @@
       </p:sp>
       <p:pic>
         <p:nvPicPr>
-          <p:cNvPr id="327" name="Google Shape;327;p20"/>
+          <p:cNvPr id="329" name="Google Shape;329;p20"/>
           <p:cNvPicPr preferRelativeResize="0"/>
           <p:nvPr/>
         </p:nvPicPr>
@@ -17701,8 +17759,8 @@
         </p:blipFill>
         <p:spPr>
           <a:xfrm>
-            <a:off x="323225" y="1240222"/>
-            <a:ext cx="4017401" cy="2145600"/>
+            <a:off x="5079850" y="3109475"/>
+            <a:ext cx="3808335" cy="1849351"/>
           </a:xfrm>
           <a:prstGeom prst="rect">
             <a:avLst/>
@@ -17715,7 +17773,7 @@
       </p:pic>
       <p:pic>
         <p:nvPicPr>
-          <p:cNvPr id="328" name="Google Shape;328;p20"/>
+          <p:cNvPr id="330" name="Google Shape;330;p20"/>
           <p:cNvPicPr preferRelativeResize="0"/>
           <p:nvPr/>
         </p:nvPicPr>
@@ -17729,8 +17787,8 @@
         </p:blipFill>
         <p:spPr>
           <a:xfrm>
-            <a:off x="721575" y="3219300"/>
-            <a:ext cx="3089800" cy="1849750"/>
+            <a:off x="428260" y="1260125"/>
+            <a:ext cx="3794404" cy="1849350"/>
           </a:xfrm>
           <a:prstGeom prst="rect">
             <a:avLst/>
@@ -17741,34 +17799,46 @@
           </a:ln>
         </p:spPr>
       </p:pic>
-      <p:pic>
-        <p:nvPicPr>
-          <p:cNvPr id="329" name="Google Shape;329;p20"/>
-          <p:cNvPicPr preferRelativeResize="0"/>
-          <p:nvPr/>
-        </p:nvPicPr>
-        <p:blipFill>
-          <a:blip r:embed="rId5">
-            <a:alphaModFix/>
-          </a:blip>
-          <a:stretch>
-            <a:fillRect/>
-          </a:stretch>
-        </p:blipFill>
+      <p:sp>
+        <p:nvSpPr>
+          <p:cNvPr id="331" name="Google Shape;331;p20"/>
+          <p:cNvSpPr txBox="1"/>
+          <p:nvPr>
+            <p:ph idx="1" type="body"/>
+          </p:nvPr>
+        </p:nvSpPr>
         <p:spPr>
           <a:xfrm>
-            <a:off x="5035500" y="1240225"/>
-            <a:ext cx="3604850" cy="1849750"/>
+            <a:off x="428238" y="3739225"/>
+            <a:ext cx="4204200" cy="999300"/>
           </a:xfrm>
           <a:prstGeom prst="rect">
             <a:avLst/>
           </a:prstGeom>
-          <a:noFill/>
-          <a:ln>
-            <a:noFill/>
-          </a:ln>
         </p:spPr>
-      </p:pic>
+        <p:txBody>
+          <a:bodyPr anchorCtr="0" anchor="t" bIns="91425" lIns="91425" spcFirstLastPara="1" rIns="91425" wrap="square" tIns="91425">
+            <a:normAutofit/>
+          </a:bodyPr>
+          <a:lstStyle/>
+          <a:p>
+            <a:pPr indent="0" lvl="0" marL="0" rtl="0" algn="l">
+              <a:spcBef>
+                <a:spcPts val="0"/>
+              </a:spcBef>
+              <a:spcAft>
+                <a:spcPts val="1200"/>
+              </a:spcAft>
+              <a:buNone/>
+            </a:pPr>
+            <a:r>
+              <a:rPr lang="en"/>
+              <a:t>Interest rate increases with term on loan.</a:t>
+            </a:r>
+            <a:endParaRPr/>
+          </a:p>
+        </p:txBody>
+      </p:sp>
     </p:spTree>
   </p:cSld>
   <p:clrMapOvr>
@@ -17782,7 +17852,7 @@
   <p:cSld>
     <p:spTree>
       <p:nvGrpSpPr>
-        <p:cNvPr id="333" name="Shape 333"/>
+        <p:cNvPr id="335" name="Shape 335"/>
         <p:cNvGrpSpPr/>
         <p:nvPr/>
       </p:nvGrpSpPr>
@@ -17796,7 +17866,7 @@
       </p:grpSpPr>
       <p:sp>
         <p:nvSpPr>
-          <p:cNvPr id="334" name="Google Shape;334;p21"/>
+          <p:cNvPr id="336" name="Google Shape;336;p21"/>
           <p:cNvSpPr txBox="1"/>
           <p:nvPr>
             <p:ph type="title"/>
@@ -17829,7 +17899,7 @@
             </a:pPr>
             <a:r>
               <a:rPr lang="en" sz="2420"/>
-              <a:t>Does the month of issue affect the re-pyament of loan?</a:t>
+              <a:t>Interest rate and loan amount during the year 2022.</a:t>
             </a:r>
             <a:endParaRPr sz="2420"/>
           </a:p>
@@ -17837,7 +17907,7 @@
       </p:sp>
       <p:sp>
         <p:nvSpPr>
-          <p:cNvPr id="335" name="Google Shape;335;p21"/>
+          <p:cNvPr id="337" name="Google Shape;337;p21"/>
           <p:cNvSpPr txBox="1"/>
           <p:nvPr>
             <p:ph idx="1" type="body"/>
@@ -17845,8 +17915,8 @@
         </p:nvSpPr>
         <p:spPr>
           <a:xfrm>
-            <a:off x="3774375" y="3175200"/>
-            <a:ext cx="5069400" cy="1938000"/>
+            <a:off x="1175600" y="3562075"/>
+            <a:ext cx="7668300" cy="1551000"/>
           </a:xfrm>
           <a:prstGeom prst="rect">
             <a:avLst/>
@@ -17854,7 +17924,7 @@
         </p:spPr>
         <p:txBody>
           <a:bodyPr anchorCtr="0" anchor="t" bIns="91425" lIns="91425" spcFirstLastPara="1" rIns="91425" wrap="square" tIns="91425">
-            <a:normAutofit fontScale="85000" lnSpcReduction="10000"/>
+            <a:normAutofit/>
           </a:bodyPr>
           <a:lstStyle/>
           <a:p>
@@ -17863,29 +17933,13 @@
                 <a:spcPts val="0"/>
               </a:spcBef>
               <a:spcAft>
-                <a:spcPts val="0"/>
+                <a:spcPts val="1200"/>
               </a:spcAft>
               <a:buNone/>
             </a:pPr>
             <a:r>
               <a:rPr lang="en"/>
-              <a:t>It looks like most loans are borrowed at the end of the year and with highest percentage of non-repayment. Also we observe a pattern that it keeps on increasing every month. </a:t>
-            </a:r>
-            <a:endParaRPr/>
-          </a:p>
-          <a:p>
-            <a:pPr indent="0" lvl="0" marL="0" rtl="0" algn="l">
-              <a:spcBef>
-                <a:spcPts val="1200"/>
-              </a:spcBef>
-              <a:spcAft>
-                <a:spcPts val="1200"/>
-              </a:spcAft>
-              <a:buNone/>
-            </a:pPr>
-            <a:r>
-              <a:rPr lang="en"/>
-              <a:t>This may also be the reason because interest rates are high in the month of december and the loan amount applied are at peak in the month of december. Month of issue maybe a contributor to non-repayment. This observation may not help a banker to avoid the risk of lending loan to the wrong client but from the borrower perspective it will be better for someone to apply for the loan in months other than "May, August, December".</a:t>
+              <a:t>Interest rate were highest in the months of May, September and December. Also in the year 2022, customers applied for highest amount of loan in the month of december and lowest in June.</a:t>
             </a:r>
             <a:endParaRPr/>
           </a:p>
@@ -17893,7 +17947,7 @@
       </p:sp>
       <p:pic>
         <p:nvPicPr>
-          <p:cNvPr id="336" name="Google Shape;336;p21"/>
+          <p:cNvPr id="338" name="Google Shape;338;p21"/>
           <p:cNvPicPr preferRelativeResize="0"/>
           <p:nvPr/>
         </p:nvPicPr>
@@ -17907,8 +17961,8 @@
         </p:blipFill>
         <p:spPr>
           <a:xfrm>
-            <a:off x="315798" y="957361"/>
-            <a:ext cx="2209051" cy="1867326"/>
+            <a:off x="1175601" y="1049897"/>
+            <a:ext cx="2754950" cy="2328801"/>
           </a:xfrm>
           <a:prstGeom prst="rect">
             <a:avLst/>
@@ -17921,7 +17975,7 @@
       </p:pic>
       <p:pic>
         <p:nvPicPr>
-          <p:cNvPr id="337" name="Google Shape;337;p21"/>
+          <p:cNvPr id="339" name="Google Shape;339;p21"/>
           <p:cNvPicPr preferRelativeResize="0"/>
           <p:nvPr/>
         </p:nvPicPr>
@@ -17935,36 +17989,8 @@
         </p:blipFill>
         <p:spPr>
           <a:xfrm>
-            <a:off x="171675" y="3003974"/>
-            <a:ext cx="2497275" cy="2109375"/>
-          </a:xfrm>
-          <a:prstGeom prst="rect">
-            <a:avLst/>
-          </a:prstGeom>
-          <a:noFill/>
-          <a:ln>
-            <a:noFill/>
-          </a:ln>
-        </p:spPr>
-      </p:pic>
-      <p:pic>
-        <p:nvPicPr>
-          <p:cNvPr id="338" name="Google Shape;338;p21"/>
-          <p:cNvPicPr preferRelativeResize="0"/>
-          <p:nvPr/>
-        </p:nvPicPr>
-        <p:blipFill>
-          <a:blip r:embed="rId5">
-            <a:alphaModFix/>
-          </a:blip>
-          <a:stretch>
-            <a:fillRect/>
-          </a:stretch>
-        </p:blipFill>
-        <p:spPr>
-          <a:xfrm>
-            <a:off x="4181625" y="957359"/>
-            <a:ext cx="4152649" cy="2217842"/>
+            <a:off x="5637625" y="836325"/>
+            <a:ext cx="2900333" cy="2449825"/>
           </a:xfrm>
           <a:prstGeom prst="rect">
             <a:avLst/>
@@ -17984,6 +18010,285 @@
 </file>
 
 <file path=ppt/theme/theme1.xml><?xml version="1.0" encoding="utf-8"?>
+<a:theme xmlns:a="http://schemas.openxmlformats.org/drawingml/2006/main" xmlns:r="http://schemas.openxmlformats.org/officeDocument/2006/relationships" name="Momentum">
+  <a:themeElements>
+    <a:clrScheme name="Momentum">
+      <a:dk1>
+        <a:srgbClr val="C0791B"/>
+      </a:dk1>
+      <a:lt1>
+        <a:srgbClr val="FFFFFF"/>
+      </a:lt1>
+      <a:dk2>
+        <a:srgbClr val="424242"/>
+      </a:dk2>
+      <a:lt2>
+        <a:srgbClr val="8DD8D3"/>
+      </a:lt2>
+      <a:accent1>
+        <a:srgbClr val="0B6374"/>
+      </a:accent1>
+      <a:accent2>
+        <a:srgbClr val="FD5B58"/>
+      </a:accent2>
+      <a:accent3>
+        <a:srgbClr val="599191"/>
+      </a:accent3>
+      <a:accent4>
+        <a:srgbClr val="D7E6A3"/>
+      </a:accent4>
+      <a:accent5>
+        <a:srgbClr val="27278B"/>
+      </a:accent5>
+      <a:accent6>
+        <a:srgbClr val="D558AB"/>
+      </a:accent6>
+      <a:hlink>
+        <a:srgbClr val="27278B"/>
+      </a:hlink>
+      <a:folHlink>
+        <a:srgbClr val="27278B"/>
+      </a:folHlink>
+    </a:clrScheme>
+    <a:fontScheme name="Office">
+      <a:majorFont>
+        <a:latin typeface="Arial"/>
+        <a:ea typeface=""/>
+        <a:cs typeface=""/>
+        <a:font script="Jpan" typeface="ＭＳ Ｐゴシック"/>
+        <a:font script="Hang" typeface="맑은 고딕"/>
+        <a:font script="Hans" typeface="宋体"/>
+        <a:font script="Hant" typeface="新細明體"/>
+        <a:font script="Arab" typeface="Times New Roman"/>
+        <a:font script="Hebr" typeface="Times New Roman"/>
+        <a:font script="Thai" typeface="Angsana New"/>
+        <a:font script="Ethi" typeface="Nyala"/>
+        <a:font script="Beng" typeface="Vrinda"/>
+        <a:font script="Gujr" typeface="Shruti"/>
+        <a:font script="Khmr" typeface="MoolBoran"/>
+        <a:font script="Knda" typeface="Tunga"/>
+        <a:font script="Guru" typeface="Raavi"/>
+        <a:font script="Cans" typeface="Euphemia"/>
+        <a:font script="Cher" typeface="Plantagenet Cherokee"/>
+        <a:font script="Yiii" typeface="Microsoft Yi Baiti"/>
+        <a:font script="Tibt" typeface="Microsoft Himalaya"/>
+        <a:font script="Thaa" typeface="MV Boli"/>
+        <a:font script="Deva" typeface="Mangal"/>
+        <a:font script="Telu" typeface="Gautami"/>
+        <a:font script="Taml" typeface="Latha"/>
+        <a:font script="Syrc" typeface="Estrangelo Edessa"/>
+        <a:font script="Orya" typeface="Kalinga"/>
+        <a:font script="Mlym" typeface="Kartika"/>
+        <a:font script="Laoo" typeface="DokChampa"/>
+        <a:font script="Sinh" typeface="Iskoola Pota"/>
+        <a:font script="Mong" typeface="Mongolian Baiti"/>
+        <a:font script="Viet" typeface="Times New Roman"/>
+        <a:font script="Uigh" typeface="Microsoft Uighur"/>
+        <a:font script="Geor" typeface="Sylfaen"/>
+      </a:majorFont>
+      <a:minorFont>
+        <a:latin typeface="Arial"/>
+        <a:ea typeface=""/>
+        <a:cs typeface=""/>
+        <a:font script="Jpan" typeface="ＭＳ Ｐゴシック"/>
+        <a:font script="Hang" typeface="맑은 고딕"/>
+        <a:font script="Hans" typeface="宋体"/>
+        <a:font script="Hant" typeface="新細明體"/>
+        <a:font script="Arab" typeface="Arial"/>
+        <a:font script="Hebr" typeface="Arial"/>
+        <a:font script="Thai" typeface="Cordia New"/>
+        <a:font script="Ethi" typeface="Nyala"/>
+        <a:font script="Beng" typeface="Vrinda"/>
+        <a:font script="Gujr" typeface="Shruti"/>
+        <a:font script="Khmr" typeface="DaunPenh"/>
+        <a:font script="Knda" typeface="Tunga"/>
+        <a:font script="Guru" typeface="Raavi"/>
+        <a:font script="Cans" typeface="Euphemia"/>
+        <a:font script="Cher" typeface="Plantagenet Cherokee"/>
+        <a:font script="Yiii" typeface="Microsoft Yi Baiti"/>
+        <a:font script="Tibt" typeface="Microsoft Himalaya"/>
+        <a:font script="Thaa" typeface="MV Boli"/>
+        <a:font script="Deva" typeface="Mangal"/>
+        <a:font script="Telu" typeface="Gautami"/>
+        <a:font script="Taml" typeface="Latha"/>
+        <a:font script="Syrc" typeface="Estrangelo Edessa"/>
+        <a:font script="Orya" typeface="Kalinga"/>
+        <a:font script="Mlym" typeface="Kartika"/>
+        <a:font script="Laoo" typeface="DokChampa"/>
+        <a:font script="Sinh" typeface="Iskoola Pota"/>
+        <a:font script="Mong" typeface="Mongolian Baiti"/>
+        <a:font script="Viet" typeface="Arial"/>
+        <a:font script="Uigh" typeface="Microsoft Uighur"/>
+        <a:font script="Geor" typeface="Sylfaen"/>
+      </a:minorFont>
+    </a:fontScheme>
+    <a:fmtScheme name="Office">
+      <a:fillStyleLst>
+        <a:solidFill>
+          <a:schemeClr val="phClr"/>
+        </a:solidFill>
+        <a:gradFill rotWithShape="1">
+          <a:gsLst>
+            <a:gs pos="0">
+              <a:schemeClr val="phClr">
+                <a:tint val="50000"/>
+                <a:satMod val="300000"/>
+              </a:schemeClr>
+            </a:gs>
+            <a:gs pos="35000">
+              <a:schemeClr val="phClr">
+                <a:tint val="37000"/>
+                <a:satMod val="300000"/>
+              </a:schemeClr>
+            </a:gs>
+            <a:gs pos="100000">
+              <a:schemeClr val="phClr">
+                <a:tint val="15000"/>
+                <a:satMod val="350000"/>
+              </a:schemeClr>
+            </a:gs>
+          </a:gsLst>
+          <a:lin ang="16200000" scaled="1"/>
+        </a:gradFill>
+        <a:gradFill rotWithShape="1">
+          <a:gsLst>
+            <a:gs pos="0">
+              <a:schemeClr val="phClr">
+                <a:tint val="100000"/>
+                <a:shade val="100000"/>
+                <a:satMod val="130000"/>
+              </a:schemeClr>
+            </a:gs>
+            <a:gs pos="100000">
+              <a:schemeClr val="phClr">
+                <a:tint val="50000"/>
+                <a:shade val="100000"/>
+                <a:satMod val="350000"/>
+              </a:schemeClr>
+            </a:gs>
+          </a:gsLst>
+          <a:lin ang="16200000" scaled="0"/>
+        </a:gradFill>
+      </a:fillStyleLst>
+      <a:lnStyleLst>
+        <a:ln w="9525" cap="flat" cmpd="sng" algn="ctr">
+          <a:solidFill>
+            <a:schemeClr val="phClr">
+              <a:shade val="95000"/>
+              <a:satMod val="105000"/>
+            </a:schemeClr>
+          </a:solidFill>
+          <a:prstDash val="solid"/>
+        </a:ln>
+        <a:ln w="25400" cap="flat" cmpd="sng" algn="ctr">
+          <a:solidFill>
+            <a:schemeClr val="phClr"/>
+          </a:solidFill>
+          <a:prstDash val="solid"/>
+        </a:ln>
+        <a:ln w="38100" cap="flat" cmpd="sng" algn="ctr">
+          <a:solidFill>
+            <a:schemeClr val="phClr"/>
+          </a:solidFill>
+          <a:prstDash val="solid"/>
+        </a:ln>
+      </a:lnStyleLst>
+      <a:effectStyleLst>
+        <a:effectStyle>
+          <a:effectLst>
+            <a:outerShdw blurRad="40000" dist="20000" dir="5400000" rotWithShape="0">
+              <a:srgbClr val="000000">
+                <a:alpha val="38000"/>
+              </a:srgbClr>
+            </a:outerShdw>
+          </a:effectLst>
+        </a:effectStyle>
+        <a:effectStyle>
+          <a:effectLst>
+            <a:outerShdw blurRad="40000" dist="23000" dir="5400000" rotWithShape="0">
+              <a:srgbClr val="000000">
+                <a:alpha val="35000"/>
+              </a:srgbClr>
+            </a:outerShdw>
+          </a:effectLst>
+        </a:effectStyle>
+        <a:effectStyle>
+          <a:effectLst>
+            <a:outerShdw blurRad="40000" dist="23000" dir="5400000" rotWithShape="0">
+              <a:srgbClr val="000000">
+                <a:alpha val="35000"/>
+              </a:srgbClr>
+            </a:outerShdw>
+          </a:effectLst>
+          <a:scene3d>
+            <a:camera prst="orthographicFront">
+              <a:rot lat="0" lon="0" rev="0"/>
+            </a:camera>
+            <a:lightRig rig="threePt" dir="t">
+              <a:rot lat="0" lon="0" rev="1200000"/>
+            </a:lightRig>
+          </a:scene3d>
+          <a:sp3d>
+            <a:bevelT w="63500" h="25400"/>
+          </a:sp3d>
+        </a:effectStyle>
+      </a:effectStyleLst>
+      <a:bgFillStyleLst>
+        <a:solidFill>
+          <a:schemeClr val="phClr"/>
+        </a:solidFill>
+        <a:gradFill rotWithShape="1">
+          <a:gsLst>
+            <a:gs pos="0">
+              <a:schemeClr val="phClr">
+                <a:tint val="40000"/>
+                <a:satMod val="350000"/>
+              </a:schemeClr>
+            </a:gs>
+            <a:gs pos="40000">
+              <a:schemeClr val="phClr">
+                <a:tint val="45000"/>
+                <a:shade val="99000"/>
+                <a:satMod val="350000"/>
+              </a:schemeClr>
+            </a:gs>
+            <a:gs pos="100000">
+              <a:schemeClr val="phClr">
+                <a:shade val="20000"/>
+                <a:satMod val="255000"/>
+              </a:schemeClr>
+            </a:gs>
+          </a:gsLst>
+          <a:path path="circle">
+            <a:fillToRect l="50000" t="-80000" r="50000" b="180000"/>
+          </a:path>
+        </a:gradFill>
+        <a:gradFill rotWithShape="1">
+          <a:gsLst>
+            <a:gs pos="0">
+              <a:schemeClr val="phClr">
+                <a:tint val="80000"/>
+                <a:satMod val="300000"/>
+              </a:schemeClr>
+            </a:gs>
+            <a:gs pos="100000">
+              <a:schemeClr val="phClr">
+                <a:shade val="30000"/>
+                <a:satMod val="200000"/>
+              </a:schemeClr>
+            </a:gs>
+          </a:gsLst>
+          <a:path path="circle">
+            <a:fillToRect l="50000" t="50000" r="50000" b="50000"/>
+          </a:path>
+        </a:gradFill>
+      </a:bgFillStyleLst>
+    </a:fmtScheme>
+  </a:themeElements>
+</a:theme>
+</file>
+
+<file path=ppt/theme/theme2.xml><?xml version="1.0" encoding="utf-8"?>
 <a:theme xmlns:a="http://schemas.openxmlformats.org/drawingml/2006/main" xmlns:r="http://schemas.openxmlformats.org/officeDocument/2006/relationships">
   <a:themeElements>
     <a:clrScheme name="Default">
@@ -18260,283 +18565,4 @@
     </a:fmtScheme>
   </a:themeElements>
 </a:theme>
-</file>
-
-<file path=ppt/theme/theme2.xml><?xml version="1.0" encoding="utf-8"?>
-<a:theme xmlns:a="http://schemas.openxmlformats.org/drawingml/2006/main" xmlns:r="http://schemas.openxmlformats.org/officeDocument/2006/relationships" name="Momentum">
-  <a:themeElements>
-    <a:clrScheme name="Momentum">
-      <a:dk1>
-        <a:srgbClr val="C0791B"/>
-      </a:dk1>
-      <a:lt1>
-        <a:srgbClr val="FFFFFF"/>
-      </a:lt1>
-      <a:dk2>
-        <a:srgbClr val="424242"/>
-      </a:dk2>
-      <a:lt2>
-        <a:srgbClr val="8DD8D3"/>
-      </a:lt2>
-      <a:accent1>
-        <a:srgbClr val="0B6374"/>
-      </a:accent1>
-      <a:accent2>
-        <a:srgbClr val="FD5B58"/>
-      </a:accent2>
-      <a:accent3>
-        <a:srgbClr val="599191"/>
-      </a:accent3>
-      <a:accent4>
-        <a:srgbClr val="D7E6A3"/>
-      </a:accent4>
-      <a:accent5>
-        <a:srgbClr val="27278B"/>
-      </a:accent5>
-      <a:accent6>
-        <a:srgbClr val="D558AB"/>
-      </a:accent6>
-      <a:hlink>
-        <a:srgbClr val="27278B"/>
-      </a:hlink>
-      <a:folHlink>
-        <a:srgbClr val="27278B"/>
-      </a:folHlink>
-    </a:clrScheme>
-    <a:fontScheme name="Office">
-      <a:majorFont>
-        <a:latin typeface="Arial"/>
-        <a:ea typeface=""/>
-        <a:cs typeface=""/>
-        <a:font script="Jpan" typeface="ＭＳ Ｐゴシック"/>
-        <a:font script="Hang" typeface="맑은 고딕"/>
-        <a:font script="Hans" typeface="宋体"/>
-        <a:font script="Hant" typeface="新細明體"/>
-        <a:font script="Arab" typeface="Times New Roman"/>
-        <a:font script="Hebr" typeface="Times New Roman"/>
-        <a:font script="Thai" typeface="Angsana New"/>
-        <a:font script="Ethi" typeface="Nyala"/>
-        <a:font script="Beng" typeface="Vrinda"/>
-        <a:font script="Gujr" typeface="Shruti"/>
-        <a:font script="Khmr" typeface="MoolBoran"/>
-        <a:font script="Knda" typeface="Tunga"/>
-        <a:font script="Guru" typeface="Raavi"/>
-        <a:font script="Cans" typeface="Euphemia"/>
-        <a:font script="Cher" typeface="Plantagenet Cherokee"/>
-        <a:font script="Yiii" typeface="Microsoft Yi Baiti"/>
-        <a:font script="Tibt" typeface="Microsoft Himalaya"/>
-        <a:font script="Thaa" typeface="MV Boli"/>
-        <a:font script="Deva" typeface="Mangal"/>
-        <a:font script="Telu" typeface="Gautami"/>
-        <a:font script="Taml" typeface="Latha"/>
-        <a:font script="Syrc" typeface="Estrangelo Edessa"/>
-        <a:font script="Orya" typeface="Kalinga"/>
-        <a:font script="Mlym" typeface="Kartika"/>
-        <a:font script="Laoo" typeface="DokChampa"/>
-        <a:font script="Sinh" typeface="Iskoola Pota"/>
-        <a:font script="Mong" typeface="Mongolian Baiti"/>
-        <a:font script="Viet" typeface="Times New Roman"/>
-        <a:font script="Uigh" typeface="Microsoft Uighur"/>
-        <a:font script="Geor" typeface="Sylfaen"/>
-      </a:majorFont>
-      <a:minorFont>
-        <a:latin typeface="Arial"/>
-        <a:ea typeface=""/>
-        <a:cs typeface=""/>
-        <a:font script="Jpan" typeface="ＭＳ Ｐゴシック"/>
-        <a:font script="Hang" typeface="맑은 고딕"/>
-        <a:font script="Hans" typeface="宋体"/>
-        <a:font script="Hant" typeface="新細明體"/>
-        <a:font script="Arab" typeface="Arial"/>
-        <a:font script="Hebr" typeface="Arial"/>
-        <a:font script="Thai" typeface="Cordia New"/>
-        <a:font script="Ethi" typeface="Nyala"/>
-        <a:font script="Beng" typeface="Vrinda"/>
-        <a:font script="Gujr" typeface="Shruti"/>
-        <a:font script="Khmr" typeface="DaunPenh"/>
-        <a:font script="Knda" typeface="Tunga"/>
-        <a:font script="Guru" typeface="Raavi"/>
-        <a:font script="Cans" typeface="Euphemia"/>
-        <a:font script="Cher" typeface="Plantagenet Cherokee"/>
-        <a:font script="Yiii" typeface="Microsoft Yi Baiti"/>
-        <a:font script="Tibt" typeface="Microsoft Himalaya"/>
-        <a:font script="Thaa" typeface="MV Boli"/>
-        <a:font script="Deva" typeface="Mangal"/>
-        <a:font script="Telu" typeface="Gautami"/>
-        <a:font script="Taml" typeface="Latha"/>
-        <a:font script="Syrc" typeface="Estrangelo Edessa"/>
-        <a:font script="Orya" typeface="Kalinga"/>
-        <a:font script="Mlym" typeface="Kartika"/>
-        <a:font script="Laoo" typeface="DokChampa"/>
-        <a:font script="Sinh" typeface="Iskoola Pota"/>
-        <a:font script="Mong" typeface="Mongolian Baiti"/>
-        <a:font script="Viet" typeface="Arial"/>
-        <a:font script="Uigh" typeface="Microsoft Uighur"/>
-        <a:font script="Geor" typeface="Sylfaen"/>
-      </a:minorFont>
-    </a:fontScheme>
-    <a:fmtScheme name="Office">
-      <a:fillStyleLst>
-        <a:solidFill>
-          <a:schemeClr val="phClr"/>
-        </a:solidFill>
-        <a:gradFill rotWithShape="1">
-          <a:gsLst>
-            <a:gs pos="0">
-              <a:schemeClr val="phClr">
-                <a:tint val="50000"/>
-                <a:satMod val="300000"/>
-              </a:schemeClr>
-            </a:gs>
-            <a:gs pos="35000">
-              <a:schemeClr val="phClr">
-                <a:tint val="37000"/>
-                <a:satMod val="300000"/>
-              </a:schemeClr>
-            </a:gs>
-            <a:gs pos="100000">
-              <a:schemeClr val="phClr">
-                <a:tint val="15000"/>
-                <a:satMod val="350000"/>
-              </a:schemeClr>
-            </a:gs>
-          </a:gsLst>
-          <a:lin ang="16200000" scaled="1"/>
-        </a:gradFill>
-        <a:gradFill rotWithShape="1">
-          <a:gsLst>
-            <a:gs pos="0">
-              <a:schemeClr val="phClr">
-                <a:tint val="100000"/>
-                <a:shade val="100000"/>
-                <a:satMod val="130000"/>
-              </a:schemeClr>
-            </a:gs>
-            <a:gs pos="100000">
-              <a:schemeClr val="phClr">
-                <a:tint val="50000"/>
-                <a:shade val="100000"/>
-                <a:satMod val="350000"/>
-              </a:schemeClr>
-            </a:gs>
-          </a:gsLst>
-          <a:lin ang="16200000" scaled="0"/>
-        </a:gradFill>
-      </a:fillStyleLst>
-      <a:lnStyleLst>
-        <a:ln w="9525" cap="flat" cmpd="sng" algn="ctr">
-          <a:solidFill>
-            <a:schemeClr val="phClr">
-              <a:shade val="95000"/>
-              <a:satMod val="105000"/>
-            </a:schemeClr>
-          </a:solidFill>
-          <a:prstDash val="solid"/>
-        </a:ln>
-        <a:ln w="25400" cap="flat" cmpd="sng" algn="ctr">
-          <a:solidFill>
-            <a:schemeClr val="phClr"/>
-          </a:solidFill>
-          <a:prstDash val="solid"/>
-        </a:ln>
-        <a:ln w="38100" cap="flat" cmpd="sng" algn="ctr">
-          <a:solidFill>
-            <a:schemeClr val="phClr"/>
-          </a:solidFill>
-          <a:prstDash val="solid"/>
-        </a:ln>
-      </a:lnStyleLst>
-      <a:effectStyleLst>
-        <a:effectStyle>
-          <a:effectLst>
-            <a:outerShdw blurRad="40000" dist="20000" dir="5400000" rotWithShape="0">
-              <a:srgbClr val="000000">
-                <a:alpha val="38000"/>
-              </a:srgbClr>
-            </a:outerShdw>
-          </a:effectLst>
-        </a:effectStyle>
-        <a:effectStyle>
-          <a:effectLst>
-            <a:outerShdw blurRad="40000" dist="23000" dir="5400000" rotWithShape="0">
-              <a:srgbClr val="000000">
-                <a:alpha val="35000"/>
-              </a:srgbClr>
-            </a:outerShdw>
-          </a:effectLst>
-        </a:effectStyle>
-        <a:effectStyle>
-          <a:effectLst>
-            <a:outerShdw blurRad="40000" dist="23000" dir="5400000" rotWithShape="0">
-              <a:srgbClr val="000000">
-                <a:alpha val="35000"/>
-              </a:srgbClr>
-            </a:outerShdw>
-          </a:effectLst>
-          <a:scene3d>
-            <a:camera prst="orthographicFront">
-              <a:rot lat="0" lon="0" rev="0"/>
-            </a:camera>
-            <a:lightRig rig="threePt" dir="t">
-              <a:rot lat="0" lon="0" rev="1200000"/>
-            </a:lightRig>
-          </a:scene3d>
-          <a:sp3d>
-            <a:bevelT w="63500" h="25400"/>
-          </a:sp3d>
-        </a:effectStyle>
-      </a:effectStyleLst>
-      <a:bgFillStyleLst>
-        <a:solidFill>
-          <a:schemeClr val="phClr"/>
-        </a:solidFill>
-        <a:gradFill rotWithShape="1">
-          <a:gsLst>
-            <a:gs pos="0">
-              <a:schemeClr val="phClr">
-                <a:tint val="40000"/>
-                <a:satMod val="350000"/>
-              </a:schemeClr>
-            </a:gs>
-            <a:gs pos="40000">
-              <a:schemeClr val="phClr">
-                <a:tint val="45000"/>
-                <a:shade val="99000"/>
-                <a:satMod val="350000"/>
-              </a:schemeClr>
-            </a:gs>
-            <a:gs pos="100000">
-              <a:schemeClr val="phClr">
-                <a:shade val="20000"/>
-                <a:satMod val="255000"/>
-              </a:schemeClr>
-            </a:gs>
-          </a:gsLst>
-          <a:path path="circle">
-            <a:fillToRect l="50000" t="-80000" r="50000" b="180000"/>
-          </a:path>
-        </a:gradFill>
-        <a:gradFill rotWithShape="1">
-          <a:gsLst>
-            <a:gs pos="0">
-              <a:schemeClr val="phClr">
-                <a:tint val="80000"/>
-                <a:satMod val="300000"/>
-              </a:schemeClr>
-            </a:gs>
-            <a:gs pos="100000">
-              <a:schemeClr val="phClr">
-                <a:shade val="30000"/>
-                <a:satMod val="200000"/>
-              </a:schemeClr>
-            </a:gs>
-          </a:gsLst>
-          <a:path path="circle">
-            <a:fillToRect l="50000" t="50000" r="50000" b="50000"/>
-          </a:path>
-        </a:gradFill>
-      </a:bgFillStyleLst>
-    </a:fmtScheme>
-  </a:themeElements>
-</a:theme>
 </file>
</xml_diff>